<commit_message>
meeting file and some other things changed
</commit_message>
<xml_diff>
--- a/docs/presentations/LORE #2.pptx
+++ b/docs/presentations/LORE #2.pptx
@@ -13637,15 +13637,6 @@
           <a:solidFill>
             <a:srgbClr val="FFFFFF"/>
           </a:solidFill>
-          <a:extLst>
-            <a:ext uri="{909E8E84-426E-40DD-AFC4-6F175D3DCCD1}">
-              <a14:hiddenFill xmlns:a14="http://schemas.microsoft.com/office/drawing/2010/main">
-                <a:solidFill>
-                  <a:srgbClr val="FFFFFF"/>
-                </a:solidFill>
-              </a14:hiddenFill>
-            </a:ext>
-          </a:extLst>
         </p:spPr>
       </p:pic>
       <p:sp>
@@ -13794,14 +13785,40 @@
           <a:bodyPr/>
           <a:lstStyle/>
           <a:p>
-            <a:r>
-              <a:rPr lang="en-GB" dirty="0"/>
-              <a:t>Nothing or I don’t know yet</a:t>
-            </a:r>
             <a:endParaRPr lang="en-BE" dirty="0"/>
           </a:p>
         </p:txBody>
       </p:sp>
+      <p:pic>
+        <p:nvPicPr>
+          <p:cNvPr id="6" name="Picture 5">
+            <a:extLst>
+              <a:ext uri="{FF2B5EF4-FFF2-40B4-BE49-F238E27FC236}">
+                <a16:creationId xmlns:a16="http://schemas.microsoft.com/office/drawing/2014/main" id="{C6E61F48-7362-C5F7-229D-C7CED972DE2F}"/>
+              </a:ext>
+            </a:extLst>
+          </p:cNvPr>
+          <p:cNvPicPr>
+            <a:picLocks noChangeAspect="1"/>
+          </p:cNvPicPr>
+          <p:nvPr/>
+        </p:nvPicPr>
+        <p:blipFill>
+          <a:blip r:embed="rId2"/>
+          <a:stretch>
+            <a:fillRect/>
+          </a:stretch>
+        </p:blipFill>
+        <p:spPr>
+          <a:xfrm>
+            <a:off x="1027640" y="2677489"/>
+            <a:ext cx="10540473" cy="2398688"/>
+          </a:xfrm>
+          <a:prstGeom prst="rect">
+            <a:avLst/>
+          </a:prstGeom>
+        </p:spPr>
+      </p:pic>
     </p:spTree>
     <p:extLst>
       <p:ext uri="{BB962C8B-B14F-4D97-AF65-F5344CB8AC3E}">
@@ -13833,10 +13850,15 @@
                             </p:stCondLst>
                             <p:childTnLst>
                               <p:par>
-                                <p:cTn id="5" presetID="1" presetClass="entr" presetSubtype="0" fill="hold" nodeType="clickEffect">
+                                <p:cTn id="5" presetID="1" presetClass="entr" presetSubtype="0" fill="hold" nodeType="clickEffect" nodePh="1">
                                   <p:stCondLst>
                                     <p:cond delay="0"/>
                                   </p:stCondLst>
+                                  <p:endCondLst>
+                                    <p:cond evt="begin" delay="0">
+                                      <p:tn val="5"/>
+                                    </p:cond>
+                                  </p:endCondLst>
                                   <p:childTnLst>
                                     <p:set>
                                       <p:cBhvr>
@@ -14755,7 +14777,7 @@
         </a:ln>
         <a:extLst>
           <a:ext uri="{91240B29-F687-4f45-9708-019B960494DF}">
-            <a14:hiddenLine xmlns:p="http://schemas.openxmlformats.org/presentationml/2006/main" xmlns="" xmlns:a14="http://schemas.microsoft.com/office/drawing/2010/main" w="9525">
+            <a14:hiddenLine xmlns:a14="http://schemas.microsoft.com/office/drawing/2010/main" xmlns="" xmlns:p="http://schemas.openxmlformats.org/presentationml/2006/main" w="9525">
               <a:solidFill>
                 <a:srgbClr val="000000"/>
               </a:solidFill>
@@ -15138,6 +15160,12 @@
 </file>
 
 <file path=customXml/item1.xml><?xml version="1.0" encoding="utf-8"?>
+<p:properties xmlns:p="http://schemas.microsoft.com/office/2006/metadata/properties" xmlns:xsi="http://www.w3.org/2001/XMLSchema-instance" xmlns:pc="http://schemas.microsoft.com/office/infopath/2007/PartnerControls">
+  <documentManagement/>
+</p:properties>
+</file>
+
+<file path=customXml/item2.xml><?xml version="1.0" encoding="utf-8"?>
 <ct:contentTypeSchema xmlns:ct="http://schemas.microsoft.com/office/2006/metadata/contentType" xmlns:ma="http://schemas.microsoft.com/office/2006/metadata/properties/metaAttributes" ct:_="" ma:_="" ma:contentTypeName="Document" ma:contentTypeID="0x010100707C9875C091B247AB9617006510CC43" ma:contentTypeVersion="9" ma:contentTypeDescription="Een nieuw document maken." ma:contentTypeScope="" ma:versionID="6792b0d8b1b497ec7b6f2fc518ad6b71">
   <xsd:schema xmlns:xsd="http://www.w3.org/2001/XMLSchema" xmlns:xs="http://www.w3.org/2001/XMLSchema" xmlns:p="http://schemas.microsoft.com/office/2006/metadata/properties" xmlns:ns2="a09e4e9c-009f-4841-8876-57cddbde6e17" xmlns:ns3="e4e19ae9-58fe-4993-a35b-a8a84bb511ff" targetNamespace="http://schemas.microsoft.com/office/2006/metadata/properties" ma:root="true" ma:fieldsID="4e3ada4487ef8e46945618bd17b59294" ns2:_="" ns3:_="">
     <xsd:import namespace="a09e4e9c-009f-4841-8876-57cddbde6e17"/>
@@ -15334,12 +15362,6 @@
 </ct:contentTypeSchema>
 </file>
 
-<file path=customXml/item2.xml><?xml version="1.0" encoding="utf-8"?>
-<p:properties xmlns:p="http://schemas.microsoft.com/office/2006/metadata/properties" xmlns:xsi="http://www.w3.org/2001/XMLSchema-instance" xmlns:pc="http://schemas.microsoft.com/office/infopath/2007/PartnerControls">
-  <documentManagement/>
-</p:properties>
-</file>
-
 <file path=customXml/item3.xml><?xml version="1.0" encoding="utf-8"?>
 <?mso-contentType ?>
 <FormTemplates xmlns="http://schemas.microsoft.com/sharepoint/v3/contenttype/forms">
@@ -15350,6 +15372,15 @@
 </file>
 
 <file path=customXml/itemProps1.xml><?xml version="1.0" encoding="utf-8"?>
+<ds:datastoreItem xmlns:ds="http://schemas.openxmlformats.org/officeDocument/2006/customXml" ds:itemID="{A5A93269-0A2D-4449-AFE7-E8570D6EC4CB}">
+  <ds:schemaRefs>
+    <ds:schemaRef ds:uri="http://schemas.microsoft.com/office/2006/metadata/properties"/>
+    <ds:schemaRef ds:uri="http://schemas.microsoft.com/office/infopath/2007/PartnerControls"/>
+  </ds:schemaRefs>
+</ds:datastoreItem>
+</file>
+
+<file path=customXml/itemProps2.xml><?xml version="1.0" encoding="utf-8"?>
 <ds:datastoreItem xmlns:ds="http://schemas.openxmlformats.org/officeDocument/2006/customXml" ds:itemID="{54449BF5-F7E1-46D5-B581-A176D4426B3C}">
   <ds:schemaRefs>
     <ds:schemaRef ds:uri="http://schemas.microsoft.com/office/2006/metadata/contentType"/>
@@ -15368,15 +15399,6 @@
 </ds:datastoreItem>
 </file>
 
-<file path=customXml/itemProps2.xml><?xml version="1.0" encoding="utf-8"?>
-<ds:datastoreItem xmlns:ds="http://schemas.openxmlformats.org/officeDocument/2006/customXml" ds:itemID="{A5A93269-0A2D-4449-AFE7-E8570D6EC4CB}">
-  <ds:schemaRefs>
-    <ds:schemaRef ds:uri="http://schemas.microsoft.com/office/2006/metadata/properties"/>
-    <ds:schemaRef ds:uri="http://schemas.microsoft.com/office/infopath/2007/PartnerControls"/>
-  </ds:schemaRefs>
-</ds:datastoreItem>
-</file>
-
 <file path=customXml/itemProps3.xml><?xml version="1.0" encoding="utf-8"?>
 <ds:datastoreItem xmlns:ds="http://schemas.openxmlformats.org/officeDocument/2006/customXml" ds:itemID="{5D6EDECA-2FC6-4CC6-BF57-774C7A66E703}">
   <ds:schemaRefs>

</xml_diff>